<commit_message>
docs: update executive presentation with final validated metrics
</commit_message>
<xml_diff>
--- a/docs/FreshCart_Executive_Presentation.pptx
+++ b/docs/FreshCart_Executive_Presentation.pptx
@@ -309,7 +309,7 @@
           <a:p>
             <a:fld id="{5BCAD085-E8A6-8845-BD4E-CB4CCA059FC4}" type="datetimeFigureOut">
               <a:rPr lang="en-US" smtClean="0"/>
-              <a:t>11/30/2025</a:t>
+              <a:t>12/9/2025</a:t>
             </a:fld>
             <a:endParaRPr lang="en-US"/>
           </a:p>
@@ -477,7 +477,7 @@
           <a:p>
             <a:fld id="{5BCAD085-E8A6-8845-BD4E-CB4CCA059FC4}" type="datetimeFigureOut">
               <a:rPr lang="en-US" smtClean="0"/>
-              <a:t>11/30/2025</a:t>
+              <a:t>12/9/2025</a:t>
             </a:fld>
             <a:endParaRPr lang="en-US"/>
           </a:p>
@@ -655,7 +655,7 @@
           <a:p>
             <a:fld id="{5BCAD085-E8A6-8845-BD4E-CB4CCA059FC4}" type="datetimeFigureOut">
               <a:rPr lang="en-US" smtClean="0"/>
-              <a:t>11/30/2025</a:t>
+              <a:t>12/9/2025</a:t>
             </a:fld>
             <a:endParaRPr lang="en-US"/>
           </a:p>
@@ -823,7 +823,7 @@
           <a:p>
             <a:fld id="{5BCAD085-E8A6-8845-BD4E-CB4CCA059FC4}" type="datetimeFigureOut">
               <a:rPr lang="en-US" smtClean="0"/>
-              <a:t>11/30/2025</a:t>
+              <a:t>12/9/2025</a:t>
             </a:fld>
             <a:endParaRPr lang="en-US"/>
           </a:p>
@@ -1068,7 +1068,7 @@
           <a:p>
             <a:fld id="{5BCAD085-E8A6-8845-BD4E-CB4CCA059FC4}" type="datetimeFigureOut">
               <a:rPr lang="en-US" smtClean="0"/>
-              <a:t>11/30/2025</a:t>
+              <a:t>12/9/2025</a:t>
             </a:fld>
             <a:endParaRPr lang="en-US"/>
           </a:p>
@@ -1353,7 +1353,7 @@
           <a:p>
             <a:fld id="{5BCAD085-E8A6-8845-BD4E-CB4CCA059FC4}" type="datetimeFigureOut">
               <a:rPr lang="en-US" smtClean="0"/>
-              <a:t>11/30/2025</a:t>
+              <a:t>12/9/2025</a:t>
             </a:fld>
             <a:endParaRPr lang="en-US"/>
           </a:p>
@@ -1772,7 +1772,7 @@
           <a:p>
             <a:fld id="{5BCAD085-E8A6-8845-BD4E-CB4CCA059FC4}" type="datetimeFigureOut">
               <a:rPr lang="en-US" smtClean="0"/>
-              <a:t>11/30/2025</a:t>
+              <a:t>12/9/2025</a:t>
             </a:fld>
             <a:endParaRPr lang="en-US"/>
           </a:p>
@@ -1889,7 +1889,7 @@
           <a:p>
             <a:fld id="{5BCAD085-E8A6-8845-BD4E-CB4CCA059FC4}" type="datetimeFigureOut">
               <a:rPr lang="en-US" smtClean="0"/>
-              <a:t>11/30/2025</a:t>
+              <a:t>12/9/2025</a:t>
             </a:fld>
             <a:endParaRPr lang="en-US"/>
           </a:p>
@@ -1984,7 +1984,7 @@
           <a:p>
             <a:fld id="{5BCAD085-E8A6-8845-BD4E-CB4CCA059FC4}" type="datetimeFigureOut">
               <a:rPr lang="en-US" smtClean="0"/>
-              <a:t>11/30/2025</a:t>
+              <a:t>12/9/2025</a:t>
             </a:fld>
             <a:endParaRPr lang="en-US"/>
           </a:p>
@@ -2259,7 +2259,7 @@
           <a:p>
             <a:fld id="{5BCAD085-E8A6-8845-BD4E-CB4CCA059FC4}" type="datetimeFigureOut">
               <a:rPr lang="en-US" smtClean="0"/>
-              <a:t>11/30/2025</a:t>
+              <a:t>12/9/2025</a:t>
             </a:fld>
             <a:endParaRPr lang="en-US"/>
           </a:p>
@@ -2511,7 +2511,7 @@
           <a:p>
             <a:fld id="{5BCAD085-E8A6-8845-BD4E-CB4CCA059FC4}" type="datetimeFigureOut">
               <a:rPr lang="en-US" smtClean="0"/>
-              <a:t>11/30/2025</a:t>
+              <a:t>12/9/2025</a:t>
             </a:fld>
             <a:endParaRPr lang="en-US"/>
           </a:p>
@@ -2722,7 +2722,7 @@
           <a:p>
             <a:fld id="{5BCAD085-E8A6-8845-BD4E-CB4CCA059FC4}" type="datetimeFigureOut">
               <a:rPr lang="en-US" smtClean="0"/>
-              <a:t>11/30/2025</a:t>
+              <a:t>12/9/2025</a:t>
             </a:fld>
             <a:endParaRPr lang="en-US"/>
           </a:p>
@@ -3193,7 +3193,7 @@
                 <a:effectLst/>
                 <a:latin typeface="-apple-system"/>
               </a:rPr>
-              <a:t>Securing $1.6M in Annual Revenue</a:t>
+              <a:t>Securing $1.7M in Annual Revenue</a:t>
             </a:r>
             <a:endParaRPr lang="en-US" sz="1400" dirty="0">
               <a:solidFill>
@@ -3240,13 +3240,13 @@
   <p:clrMapOvr>
     <a:masterClrMapping/>
   </p:clrMapOvr>
-  <mc:AlternateContent xmlns:mc="http://schemas.openxmlformats.org/markup-compatibility/2006">
-    <mc:Choice xmlns:p14="http://schemas.microsoft.com/office/powerpoint/2010/main" Requires="p14">
+  <mc:AlternateContent xmlns:mc="http://schemas.openxmlformats.org/markup-compatibility/2006" xmlns:p14="http://schemas.microsoft.com/office/powerpoint/2010/main">
+    <mc:Choice Requires="p14">
       <p:transition spd="slow" p14:dur="1500">
         <p:split orient="vert"/>
       </p:transition>
     </mc:Choice>
-    <mc:Fallback>
+    <mc:Fallback xmlns="">
       <p:transition spd="slow">
         <p:split orient="vert"/>
       </p:transition>
@@ -5812,13 +5812,13 @@
   <p:clrMapOvr>
     <a:masterClrMapping/>
   </p:clrMapOvr>
-  <mc:AlternateContent xmlns:mc="http://schemas.openxmlformats.org/markup-compatibility/2006">
-    <mc:Choice xmlns:p14="http://schemas.microsoft.com/office/powerpoint/2010/main" Requires="p14">
+  <mc:AlternateContent xmlns:mc="http://schemas.openxmlformats.org/markup-compatibility/2006" xmlns:p14="http://schemas.microsoft.com/office/powerpoint/2010/main">
+    <mc:Choice Requires="p14">
       <p:transition spd="slow" p14:dur="800">
         <p:circle/>
       </p:transition>
     </mc:Choice>
-    <mc:Fallback>
+    <mc:Fallback xmlns="">
       <p:transition spd="slow">
         <p:circle/>
       </p:transition>
@@ -6344,7 +6344,7 @@
                 <a:effectLst/>
                 <a:latin typeface="Helveticasinav" panose="02000503000000020004" pitchFamily="2" charset="-94"/>
               </a:rPr>
-              <a:t>~ $1.61 Million / year</a:t>
+              <a:t>~ $1.1 Million / year</a:t>
             </a:r>
             <a:r>
               <a:rPr lang="en-US" b="0" i="0" dirty="0">
@@ -7386,7 +7386,7 @@
                 <a:effectLst/>
                 <a:latin typeface="Helveticasinav" panose="02000503000000020004" pitchFamily="2" charset="-94"/>
               </a:rPr>
-              <a:t>~$1.7 Million</a:t>
+              <a:t>~$1.1 Million</a:t>
             </a:r>
             <a:r>
               <a:rPr lang="en-US" b="0" i="0" dirty="0">
@@ -7428,7 +7428,7 @@
         <p:spPr bwMode="auto">
           <a:xfrm>
             <a:off x="570491" y="3593166"/>
-            <a:ext cx="8091959" cy="276999"/>
+            <a:ext cx="7963719" cy="276999"/>
           </a:xfrm>
           <a:prstGeom prst="rect">
             <a:avLst/>
@@ -7520,7 +7520,7 @@
                 <a:effectLst/>
                 <a:latin typeface="Helveticasinav" panose="02000503000000020004" pitchFamily="2" charset="-94"/>
               </a:rPr>
-              <a:t>~1070% .</a:t>
+              <a:t>~153% .</a:t>
             </a:r>
             <a:endParaRPr kumimoji="0" lang="en-US" altLang="en-US" b="0" i="0" u="none" strike="noStrike" cap="none" normalizeH="0" baseline="0" dirty="0">
               <a:ln>
@@ -7552,7 +7552,7 @@
         <p:spPr bwMode="auto">
           <a:xfrm>
             <a:off x="570491" y="4369042"/>
-            <a:ext cx="7367401" cy="276999"/>
+            <a:ext cx="7559762" cy="276999"/>
           </a:xfrm>
           <a:prstGeom prst="rect">
             <a:avLst/>
@@ -7713,7 +7713,7 @@
                 <a:effectLst/>
                 <a:latin typeface="Helveticasinav" panose="02000503000000020004" pitchFamily="2" charset="-94"/>
               </a:rPr>
-              <a:t>11.</a:t>
+              <a:t>1.53.</a:t>
             </a:r>
             <a:endParaRPr kumimoji="0" lang="en-US" altLang="en-US" b="0" i="0" u="none" strike="noStrike" cap="none" normalizeH="0" baseline="0" dirty="0">
               <a:ln>
@@ -7864,7 +7864,7 @@
                 <a:effectLst/>
                 <a:latin typeface="Helveticasinav" panose="02000503000000020004" pitchFamily="2" charset="-94"/>
               </a:rPr>
-              <a:t>     a strong predictive capability score (ROC-AUC of 0.7644).</a:t>
+              <a:t>     a strong predictive capability score (ROC-AUC of 0.77).</a:t>
             </a:r>
           </a:p>
         </p:txBody>
@@ -7874,13 +7874,13 @@
   <p:clrMapOvr>
     <a:masterClrMapping/>
   </p:clrMapOvr>
-  <mc:AlternateContent xmlns:mc="http://schemas.openxmlformats.org/markup-compatibility/2006">
-    <mc:Choice xmlns:p14="http://schemas.microsoft.com/office/powerpoint/2010/main" Requires="p14">
+  <mc:AlternateContent xmlns:mc="http://schemas.openxmlformats.org/markup-compatibility/2006" xmlns:p14="http://schemas.microsoft.com/office/powerpoint/2010/main">
+    <mc:Choice Requires="p14">
       <p:transition spd="slow" p14:dur="3400">
         <p14:reveal/>
       </p:transition>
     </mc:Choice>
-    <mc:Fallback>
+    <mc:Fallback xmlns="">
       <p:transition spd="slow">
         <p:fade/>
       </p:transition>
@@ -8764,13 +8764,13 @@
   <p:clrMapOvr>
     <a:masterClrMapping/>
   </p:clrMapOvr>
-  <mc:AlternateContent xmlns:mc="http://schemas.openxmlformats.org/markup-compatibility/2006">
-    <mc:Choice xmlns:p159="http://schemas.microsoft.com/office/powerpoint/2015/09/main" Requires="p159">
+  <mc:AlternateContent xmlns:mc="http://schemas.openxmlformats.org/markup-compatibility/2006" xmlns:p159="http://schemas.microsoft.com/office/powerpoint/2015/09/main">
+    <mc:Choice Requires="p159">
       <p:transition xmlns:p14="http://schemas.microsoft.com/office/powerpoint/2010/main" spd="slow" p14:dur="2000">
         <p159:morph option="byObject"/>
       </p:transition>
     </mc:Choice>
-    <mc:Fallback>
+    <mc:Fallback xmlns="">
       <p:transition spd="slow">
         <p:fade/>
       </p:transition>
@@ -9591,13 +9591,13 @@
   <p:clrMapOvr>
     <a:masterClrMapping/>
   </p:clrMapOvr>
-  <mc:AlternateContent xmlns:mc="http://schemas.openxmlformats.org/markup-compatibility/2006">
-    <mc:Choice xmlns:p14="http://schemas.microsoft.com/office/powerpoint/2010/main" Requires="p14">
+  <mc:AlternateContent xmlns:mc="http://schemas.openxmlformats.org/markup-compatibility/2006" xmlns:p14="http://schemas.microsoft.com/office/powerpoint/2010/main">
+    <mc:Choice Requires="p14">
       <p:transition spd="slow" p14:dur="800">
         <p14:flythrough/>
       </p:transition>
     </mc:Choice>
-    <mc:Fallback>
+    <mc:Fallback xmlns="">
       <p:transition spd="slow">
         <p:fade/>
       </p:transition>

</xml_diff>